<commit_message>
Modified notations of Rotations and Vectors. Cleaned the Wind frame discussion.
</commit_message>
<xml_diff>
--- a/Springer_UAV_book/Pictures/Fig6.pptx
+++ b/Springer_UAV_book/Pictures/Fig6.pptx
@@ -289,7 +289,7 @@
             <a:fld id="{1D8BD707-D9CF-40AE-B4C6-C98DA3205C09}" type="datetimeFigureOut">
               <a:rPr lang="en-US" smtClean="0"/>
               <a:pPr/>
-              <a:t>4/11/2012</a:t>
+              <a:t>7/31/2012</a:t>
             </a:fld>
             <a:endParaRPr lang="en-US"/>
           </a:p>
@@ -456,7 +456,7 @@
             <a:fld id="{1D8BD707-D9CF-40AE-B4C6-C98DA3205C09}" type="datetimeFigureOut">
               <a:rPr lang="en-US" smtClean="0"/>
               <a:pPr/>
-              <a:t>4/11/2012</a:t>
+              <a:t>7/31/2012</a:t>
             </a:fld>
             <a:endParaRPr lang="en-US"/>
           </a:p>
@@ -633,7 +633,7 @@
             <a:fld id="{1D8BD707-D9CF-40AE-B4C6-C98DA3205C09}" type="datetimeFigureOut">
               <a:rPr lang="en-US" smtClean="0"/>
               <a:pPr/>
-              <a:t>4/11/2012</a:t>
+              <a:t>7/31/2012</a:t>
             </a:fld>
             <a:endParaRPr lang="en-US"/>
           </a:p>
@@ -800,7 +800,7 @@
             <a:fld id="{1D8BD707-D9CF-40AE-B4C6-C98DA3205C09}" type="datetimeFigureOut">
               <a:rPr lang="en-US" smtClean="0"/>
               <a:pPr/>
-              <a:t>4/11/2012</a:t>
+              <a:t>7/31/2012</a:t>
             </a:fld>
             <a:endParaRPr lang="en-US"/>
           </a:p>
@@ -1043,7 +1043,7 @@
             <a:fld id="{1D8BD707-D9CF-40AE-B4C6-C98DA3205C09}" type="datetimeFigureOut">
               <a:rPr lang="en-US" smtClean="0"/>
               <a:pPr/>
-              <a:t>4/11/2012</a:t>
+              <a:t>7/31/2012</a:t>
             </a:fld>
             <a:endParaRPr lang="en-US"/>
           </a:p>
@@ -1328,7 +1328,7 @@
             <a:fld id="{1D8BD707-D9CF-40AE-B4C6-C98DA3205C09}" type="datetimeFigureOut">
               <a:rPr lang="en-US" smtClean="0"/>
               <a:pPr/>
-              <a:t>4/11/2012</a:t>
+              <a:t>7/31/2012</a:t>
             </a:fld>
             <a:endParaRPr lang="en-US"/>
           </a:p>
@@ -1747,7 +1747,7 @@
             <a:fld id="{1D8BD707-D9CF-40AE-B4C6-C98DA3205C09}" type="datetimeFigureOut">
               <a:rPr lang="en-US" smtClean="0"/>
               <a:pPr/>
-              <a:t>4/11/2012</a:t>
+              <a:t>7/31/2012</a:t>
             </a:fld>
             <a:endParaRPr lang="en-US"/>
           </a:p>
@@ -1862,7 +1862,7 @@
             <a:fld id="{1D8BD707-D9CF-40AE-B4C6-C98DA3205C09}" type="datetimeFigureOut">
               <a:rPr lang="en-US" smtClean="0"/>
               <a:pPr/>
-              <a:t>4/11/2012</a:t>
+              <a:t>7/31/2012</a:t>
             </a:fld>
             <a:endParaRPr lang="en-US"/>
           </a:p>
@@ -1954,7 +1954,7 @@
             <a:fld id="{1D8BD707-D9CF-40AE-B4C6-C98DA3205C09}" type="datetimeFigureOut">
               <a:rPr lang="en-US" smtClean="0"/>
               <a:pPr/>
-              <a:t>4/11/2012</a:t>
+              <a:t>7/31/2012</a:t>
             </a:fld>
             <a:endParaRPr lang="en-US"/>
           </a:p>
@@ -2228,7 +2228,7 @@
             <a:fld id="{1D8BD707-D9CF-40AE-B4C6-C98DA3205C09}" type="datetimeFigureOut">
               <a:rPr lang="en-US" smtClean="0"/>
               <a:pPr/>
-              <a:t>4/11/2012</a:t>
+              <a:t>7/31/2012</a:t>
             </a:fld>
             <a:endParaRPr lang="en-US"/>
           </a:p>
@@ -2478,7 +2478,7 @@
             <a:fld id="{1D8BD707-D9CF-40AE-B4C6-C98DA3205C09}" type="datetimeFigureOut">
               <a:rPr lang="en-US" smtClean="0"/>
               <a:pPr/>
-              <a:t>4/11/2012</a:t>
+              <a:t>7/31/2012</a:t>
             </a:fld>
             <a:endParaRPr lang="en-US"/>
           </a:p>
@@ -2688,7 +2688,7 @@
             <a:fld id="{1D8BD707-D9CF-40AE-B4C6-C98DA3205C09}" type="datetimeFigureOut">
               <a:rPr lang="en-US" smtClean="0"/>
               <a:pPr/>
-              <a:t>4/11/2012</a:t>
+              <a:t>7/31/2012</a:t>
             </a:fld>
             <a:endParaRPr lang="en-US"/>
           </a:p>
@@ -3467,12 +3467,12 @@
           <p:nvPr/>
         </p:nvGraphicFramePr>
         <p:xfrm>
-          <a:off x="5503862" y="5224464"/>
-          <a:ext cx="379413" cy="422275"/>
+          <a:off x="5492750" y="5246688"/>
+          <a:ext cx="403225" cy="376237"/>
         </p:xfrm>
         <a:graphic>
           <a:graphicData uri="http://schemas.openxmlformats.org/presentationml/2006/ole">
-            <p:oleObj spid="_x0000_s42000" name="Equation" r:id="rId7" imgW="203040" imgH="228600" progId="Equation.DSMT4">
+            <p:oleObj spid="_x0000_s42000" name="Equation" r:id="rId7" imgW="215640" imgH="203040" progId="Equation.DSMT4">
               <p:embed/>
             </p:oleObj>
           </a:graphicData>

</xml_diff>

<commit_message>
Intermediate state of significant rewriting of vector notations. Stopped at Eq35.
</commit_message>
<xml_diff>
--- a/Springer_UAV_book/Pictures/Fig6.pptx
+++ b/Springer_UAV_book/Pictures/Fig6.pptx
@@ -289,7 +289,7 @@
             <a:fld id="{1D8BD707-D9CF-40AE-B4C6-C98DA3205C09}" type="datetimeFigureOut">
               <a:rPr lang="en-US" smtClean="0"/>
               <a:pPr/>
-              <a:t>7/31/2012</a:t>
+              <a:t>8/6/2012</a:t>
             </a:fld>
             <a:endParaRPr lang="en-US"/>
           </a:p>
@@ -456,7 +456,7 @@
             <a:fld id="{1D8BD707-D9CF-40AE-B4C6-C98DA3205C09}" type="datetimeFigureOut">
               <a:rPr lang="en-US" smtClean="0"/>
               <a:pPr/>
-              <a:t>7/31/2012</a:t>
+              <a:t>8/6/2012</a:t>
             </a:fld>
             <a:endParaRPr lang="en-US"/>
           </a:p>
@@ -633,7 +633,7 @@
             <a:fld id="{1D8BD707-D9CF-40AE-B4C6-C98DA3205C09}" type="datetimeFigureOut">
               <a:rPr lang="en-US" smtClean="0"/>
               <a:pPr/>
-              <a:t>7/31/2012</a:t>
+              <a:t>8/6/2012</a:t>
             </a:fld>
             <a:endParaRPr lang="en-US"/>
           </a:p>
@@ -800,7 +800,7 @@
             <a:fld id="{1D8BD707-D9CF-40AE-B4C6-C98DA3205C09}" type="datetimeFigureOut">
               <a:rPr lang="en-US" smtClean="0"/>
               <a:pPr/>
-              <a:t>7/31/2012</a:t>
+              <a:t>8/6/2012</a:t>
             </a:fld>
             <a:endParaRPr lang="en-US"/>
           </a:p>
@@ -1043,7 +1043,7 @@
             <a:fld id="{1D8BD707-D9CF-40AE-B4C6-C98DA3205C09}" type="datetimeFigureOut">
               <a:rPr lang="en-US" smtClean="0"/>
               <a:pPr/>
-              <a:t>7/31/2012</a:t>
+              <a:t>8/6/2012</a:t>
             </a:fld>
             <a:endParaRPr lang="en-US"/>
           </a:p>
@@ -1328,7 +1328,7 @@
             <a:fld id="{1D8BD707-D9CF-40AE-B4C6-C98DA3205C09}" type="datetimeFigureOut">
               <a:rPr lang="en-US" smtClean="0"/>
               <a:pPr/>
-              <a:t>7/31/2012</a:t>
+              <a:t>8/6/2012</a:t>
             </a:fld>
             <a:endParaRPr lang="en-US"/>
           </a:p>
@@ -1747,7 +1747,7 @@
             <a:fld id="{1D8BD707-D9CF-40AE-B4C6-C98DA3205C09}" type="datetimeFigureOut">
               <a:rPr lang="en-US" smtClean="0"/>
               <a:pPr/>
-              <a:t>7/31/2012</a:t>
+              <a:t>8/6/2012</a:t>
             </a:fld>
             <a:endParaRPr lang="en-US"/>
           </a:p>
@@ -1862,7 +1862,7 @@
             <a:fld id="{1D8BD707-D9CF-40AE-B4C6-C98DA3205C09}" type="datetimeFigureOut">
               <a:rPr lang="en-US" smtClean="0"/>
               <a:pPr/>
-              <a:t>7/31/2012</a:t>
+              <a:t>8/6/2012</a:t>
             </a:fld>
             <a:endParaRPr lang="en-US"/>
           </a:p>
@@ -1954,7 +1954,7 @@
             <a:fld id="{1D8BD707-D9CF-40AE-B4C6-C98DA3205C09}" type="datetimeFigureOut">
               <a:rPr lang="en-US" smtClean="0"/>
               <a:pPr/>
-              <a:t>7/31/2012</a:t>
+              <a:t>8/6/2012</a:t>
             </a:fld>
             <a:endParaRPr lang="en-US"/>
           </a:p>
@@ -2228,7 +2228,7 @@
             <a:fld id="{1D8BD707-D9CF-40AE-B4C6-C98DA3205C09}" type="datetimeFigureOut">
               <a:rPr lang="en-US" smtClean="0"/>
               <a:pPr/>
-              <a:t>7/31/2012</a:t>
+              <a:t>8/6/2012</a:t>
             </a:fld>
             <a:endParaRPr lang="en-US"/>
           </a:p>
@@ -2478,7 +2478,7 @@
             <a:fld id="{1D8BD707-D9CF-40AE-B4C6-C98DA3205C09}" type="datetimeFigureOut">
               <a:rPr lang="en-US" smtClean="0"/>
               <a:pPr/>
-              <a:t>7/31/2012</a:t>
+              <a:t>8/6/2012</a:t>
             </a:fld>
             <a:endParaRPr lang="en-US"/>
           </a:p>
@@ -2688,7 +2688,7 @@
             <a:fld id="{1D8BD707-D9CF-40AE-B4C6-C98DA3205C09}" type="datetimeFigureOut">
               <a:rPr lang="en-US" smtClean="0"/>
               <a:pPr/>
-              <a:t>7/31/2012</a:t>
+              <a:t>8/6/2012</a:t>
             </a:fld>
             <a:endParaRPr lang="en-US"/>
           </a:p>
@@ -3467,12 +3467,12 @@
           <p:nvPr/>
         </p:nvGraphicFramePr>
         <p:xfrm>
-          <a:off x="5492750" y="5246688"/>
-          <a:ext cx="403225" cy="376237"/>
+          <a:off x="5492750" y="5211763"/>
+          <a:ext cx="403225" cy="446087"/>
         </p:xfrm>
         <a:graphic>
           <a:graphicData uri="http://schemas.openxmlformats.org/presentationml/2006/ole">
-            <p:oleObj spid="_x0000_s42000" name="Equation" r:id="rId7" imgW="215640" imgH="203040" progId="Equation.DSMT4">
+            <p:oleObj spid="_x0000_s42000" name="Equation" r:id="rId7" imgW="215640" imgH="241200" progId="Equation.DSMT4">
               <p:embed/>
             </p:oleObj>
           </a:graphicData>

</xml_diff>